<commit_message>
WIP add project routes file
</commit_message>
<xml_diff>
--- a/2021-07-08/laravel-performance-pitfalls.pptx
+++ b/2021-07-08/laravel-performance-pitfalls.pptx
@@ -215,7 +215,7 @@
           <a:p>
             <a:fld id="{3D627261-6120-416B-8E33-CE15F693C555}" type="datetimeFigureOut">
               <a:rPr lang="en-US" smtClean="0"/>
-              <a:t>6/19/2021</a:t>
+              <a:t>7/3/2021</a:t>
             </a:fld>
             <a:endParaRPr lang="en-US"/>
           </a:p>
@@ -629,7 +629,7 @@
           <a:p>
             <a:fld id="{B280752C-A90A-4D9F-A853-0FABF0AF221E}" type="datetimeFigureOut">
               <a:rPr lang="en-US" smtClean="0"/>
-              <a:t>6/19/2021</a:t>
+              <a:t>7/3/2021</a:t>
             </a:fld>
             <a:endParaRPr lang="en-US"/>
           </a:p>
@@ -839,7 +839,7 @@
           <a:p>
             <a:fld id="{B280752C-A90A-4D9F-A853-0FABF0AF221E}" type="datetimeFigureOut">
               <a:rPr lang="en-US" smtClean="0"/>
-              <a:t>6/19/2021</a:t>
+              <a:t>7/3/2021</a:t>
             </a:fld>
             <a:endParaRPr lang="en-US"/>
           </a:p>
@@ -1059,7 +1059,7 @@
           <a:p>
             <a:fld id="{B280752C-A90A-4D9F-A853-0FABF0AF221E}" type="datetimeFigureOut">
               <a:rPr lang="en-US" smtClean="0"/>
-              <a:t>6/19/2021</a:t>
+              <a:t>7/3/2021</a:t>
             </a:fld>
             <a:endParaRPr lang="en-US"/>
           </a:p>
@@ -1269,7 +1269,7 @@
           <a:p>
             <a:fld id="{B280752C-A90A-4D9F-A853-0FABF0AF221E}" type="datetimeFigureOut">
               <a:rPr lang="en-US" smtClean="0"/>
-              <a:t>6/19/2021</a:t>
+              <a:t>7/3/2021</a:t>
             </a:fld>
             <a:endParaRPr lang="en-US"/>
           </a:p>
@@ -1556,7 +1556,7 @@
           <a:p>
             <a:fld id="{B280752C-A90A-4D9F-A853-0FABF0AF221E}" type="datetimeFigureOut">
               <a:rPr lang="en-US" smtClean="0"/>
-              <a:t>6/19/2021</a:t>
+              <a:t>7/3/2021</a:t>
             </a:fld>
             <a:endParaRPr lang="en-US"/>
           </a:p>
@@ -1833,7 +1833,7 @@
           <a:p>
             <a:fld id="{B280752C-A90A-4D9F-A853-0FABF0AF221E}" type="datetimeFigureOut">
               <a:rPr lang="en-US" smtClean="0"/>
-              <a:t>6/19/2021</a:t>
+              <a:t>7/3/2021</a:t>
             </a:fld>
             <a:endParaRPr lang="en-US"/>
           </a:p>
@@ -2257,7 +2257,7 @@
           <a:p>
             <a:fld id="{B280752C-A90A-4D9F-A853-0FABF0AF221E}" type="datetimeFigureOut">
               <a:rPr lang="en-US" smtClean="0"/>
-              <a:t>6/19/2021</a:t>
+              <a:t>7/3/2021</a:t>
             </a:fld>
             <a:endParaRPr lang="en-US"/>
           </a:p>
@@ -2410,7 +2410,7 @@
           <a:p>
             <a:fld id="{B280752C-A90A-4D9F-A853-0FABF0AF221E}" type="datetimeFigureOut">
               <a:rPr lang="en-US" smtClean="0"/>
-              <a:t>6/19/2021</a:t>
+              <a:t>7/3/2021</a:t>
             </a:fld>
             <a:endParaRPr lang="en-US"/>
           </a:p>
@@ -2535,7 +2535,7 @@
           <a:p>
             <a:fld id="{B280752C-A90A-4D9F-A853-0FABF0AF221E}" type="datetimeFigureOut">
               <a:rPr lang="en-US" smtClean="0"/>
-              <a:t>6/19/2021</a:t>
+              <a:t>7/3/2021</a:t>
             </a:fld>
             <a:endParaRPr lang="en-US"/>
           </a:p>
@@ -2858,7 +2858,7 @@
           <a:p>
             <a:fld id="{B280752C-A90A-4D9F-A853-0FABF0AF221E}" type="datetimeFigureOut">
               <a:rPr lang="en-US" smtClean="0"/>
-              <a:t>6/19/2021</a:t>
+              <a:t>7/3/2021</a:t>
             </a:fld>
             <a:endParaRPr lang="en-US"/>
           </a:p>
@@ -3158,7 +3158,7 @@
           <a:p>
             <a:fld id="{B280752C-A90A-4D9F-A853-0FABF0AF221E}" type="datetimeFigureOut">
               <a:rPr lang="en-US" smtClean="0"/>
-              <a:t>6/19/2021</a:t>
+              <a:t>7/3/2021</a:t>
             </a:fld>
             <a:endParaRPr lang="en-US"/>
           </a:p>
@@ -3411,7 +3411,7 @@
           <a:p>
             <a:fld id="{B280752C-A90A-4D9F-A853-0FABF0AF221E}" type="datetimeFigureOut">
               <a:rPr lang="en-US" smtClean="0"/>
-              <a:t>6/19/2021</a:t>
+              <a:t>7/3/2021</a:t>
             </a:fld>
             <a:endParaRPr lang="en-US"/>
           </a:p>
@@ -3919,7 +3919,7 @@
                 </a:solidFill>
                 <a:latin typeface="Font Awesome 5 Free Solid" panose="02000503000000000000" pitchFamily="50" charset="2"/>
               </a:rPr>
-              <a:t></a:t>
+              <a:t> </a:t>
             </a:r>
             <a:r>
               <a:rPr lang="en-US" dirty="0">
@@ -3928,7 +3928,25 @@
                 </a:solidFill>
                 <a:latin typeface="IBM Plex Mono" panose="020B0509050203000203" pitchFamily="49" charset="0"/>
               </a:rPr>
-              <a:t> 07.08.2021</a:t>
+              <a:t> Thursday, July 8</a:t>
+            </a:r>
+            <a:r>
+              <a:rPr lang="en-US" baseline="30000" dirty="0">
+                <a:solidFill>
+                  <a:schemeClr val="bg1"/>
+                </a:solidFill>
+                <a:latin typeface="IBM Plex Mono" panose="020B0509050203000203" pitchFamily="49" charset="0"/>
+              </a:rPr>
+              <a:t>th</a:t>
+            </a:r>
+            <a:r>
+              <a:rPr lang="en-US" dirty="0">
+                <a:solidFill>
+                  <a:schemeClr val="bg1"/>
+                </a:solidFill>
+                <a:latin typeface="IBM Plex Mono" panose="020B0509050203000203" pitchFamily="49" charset="0"/>
+              </a:rPr>
+              <a:t>, 2021</a:t>
             </a:r>
           </a:p>
           <a:p>
@@ -3956,7 +3974,7 @@
                 </a:solidFill>
                 <a:latin typeface="IBM Plex Mono" panose="020B0509050203000203" pitchFamily="49" charset="0"/>
               </a:rPr>
-              <a:t> Salt Mine Productive Workspace</a:t>
+              <a:t>  Salt Mine Productive Workspace</a:t>
             </a:r>
           </a:p>
         </p:txBody>
@@ -3989,14 +4007,6 @@
 <file path=ppt/slides/slide10.xml><?xml version="1.0" encoding="utf-8"?>
 <p:sld xmlns:a="http://schemas.openxmlformats.org/drawingml/2006/main" xmlns:r="http://schemas.openxmlformats.org/officeDocument/2006/relationships" xmlns:p="http://schemas.openxmlformats.org/presentationml/2006/main">
   <p:cSld>
-    <p:bg>
-      <p:bgPr>
-        <a:solidFill>
-          <a:schemeClr val="bg2"/>
-        </a:solidFill>
-        <a:effectLst/>
-      </p:bgPr>
-    </p:bg>
     <p:spTree>
       <p:nvGrpSpPr>
         <p:cNvPr id="1" name=""/>
@@ -4210,14 +4220,6 @@
 <file path=ppt/slides/slide11.xml><?xml version="1.0" encoding="utf-8"?>
 <p:sld xmlns:a="http://schemas.openxmlformats.org/drawingml/2006/main" xmlns:r="http://schemas.openxmlformats.org/officeDocument/2006/relationships" xmlns:p="http://schemas.openxmlformats.org/presentationml/2006/main">
   <p:cSld>
-    <p:bg>
-      <p:bgPr>
-        <a:solidFill>
-          <a:schemeClr val="bg2"/>
-        </a:solidFill>
-        <a:effectLst/>
-      </p:bgPr>
-    </p:bg>
     <p:spTree>
       <p:nvGrpSpPr>
         <p:cNvPr id="1" name=""/>
@@ -4383,14 +4385,6 @@
 <file path=ppt/slides/slide12.xml><?xml version="1.0" encoding="utf-8"?>
 <p:sld xmlns:a="http://schemas.openxmlformats.org/drawingml/2006/main" xmlns:r="http://schemas.openxmlformats.org/officeDocument/2006/relationships" xmlns:p="http://schemas.openxmlformats.org/presentationml/2006/main">
   <p:cSld>
-    <p:bg>
-      <p:bgPr>
-        <a:solidFill>
-          <a:schemeClr val="bg2"/>
-        </a:solidFill>
-        <a:effectLst/>
-      </p:bgPr>
-    </p:bg>
     <p:spTree>
       <p:nvGrpSpPr>
         <p:cNvPr id="1" name=""/>
@@ -4556,14 +4550,6 @@
 <file path=ppt/slides/slide13.xml><?xml version="1.0" encoding="utf-8"?>
 <p:sld xmlns:a="http://schemas.openxmlformats.org/drawingml/2006/main" xmlns:r="http://schemas.openxmlformats.org/officeDocument/2006/relationships" xmlns:p="http://schemas.openxmlformats.org/presentationml/2006/main">
   <p:cSld>
-    <p:bg>
-      <p:bgPr>
-        <a:solidFill>
-          <a:schemeClr val="bg2"/>
-        </a:solidFill>
-        <a:effectLst/>
-      </p:bgPr>
-    </p:bg>
     <p:spTree>
       <p:nvGrpSpPr>
         <p:cNvPr id="1" name=""/>
@@ -4729,14 +4715,6 @@
 <file path=ppt/slides/slide14.xml><?xml version="1.0" encoding="utf-8"?>
 <p:sld xmlns:a="http://schemas.openxmlformats.org/drawingml/2006/main" xmlns:r="http://schemas.openxmlformats.org/officeDocument/2006/relationships" xmlns:p="http://schemas.openxmlformats.org/presentationml/2006/main">
   <p:cSld>
-    <p:bg>
-      <p:bgPr>
-        <a:solidFill>
-          <a:schemeClr val="bg2"/>
-        </a:solidFill>
-        <a:effectLst/>
-      </p:bgPr>
-    </p:bg>
     <p:spTree>
       <p:nvGrpSpPr>
         <p:cNvPr id="1" name=""/>
@@ -4902,14 +4880,6 @@
 <file path=ppt/slides/slide15.xml><?xml version="1.0" encoding="utf-8"?>
 <p:sld xmlns:a="http://schemas.openxmlformats.org/drawingml/2006/main" xmlns:r="http://schemas.openxmlformats.org/officeDocument/2006/relationships" xmlns:p="http://schemas.openxmlformats.org/presentationml/2006/main">
   <p:cSld>
-    <p:bg>
-      <p:bgPr>
-        <a:solidFill>
-          <a:schemeClr val="bg2"/>
-        </a:solidFill>
-        <a:effectLst/>
-      </p:bgPr>
-    </p:bg>
     <p:spTree>
       <p:nvGrpSpPr>
         <p:cNvPr id="1" name=""/>
@@ -5075,14 +5045,6 @@
 <file path=ppt/slides/slide16.xml><?xml version="1.0" encoding="utf-8"?>
 <p:sld xmlns:a="http://schemas.openxmlformats.org/drawingml/2006/main" xmlns:r="http://schemas.openxmlformats.org/officeDocument/2006/relationships" xmlns:p="http://schemas.openxmlformats.org/presentationml/2006/main">
   <p:cSld>
-    <p:bg>
-      <p:bgPr>
-        <a:solidFill>
-          <a:schemeClr val="bg2"/>
-        </a:solidFill>
-        <a:effectLst/>
-      </p:bgPr>
-    </p:bg>
     <p:spTree>
       <p:nvGrpSpPr>
         <p:cNvPr id="1" name=""/>
@@ -5627,14 +5589,14 @@
           <p:nvPr>
             <p:extLst>
               <p:ext uri="{D42A27DB-BD31-4B8C-83A1-F6EECF244321}">
-                <p14:modId xmlns:p14="http://schemas.microsoft.com/office/powerpoint/2010/main" val="4176442067"/>
+                <p14:modId xmlns:p14="http://schemas.microsoft.com/office/powerpoint/2010/main" val="3194157937"/>
               </p:ext>
             </p:extLst>
           </p:nvPr>
         </p:nvGraphicFramePr>
         <p:xfrm>
-          <a:off x="2930077" y="1563628"/>
-          <a:ext cx="6530376" cy="4206240"/>
+          <a:off x="2930077" y="1676400"/>
+          <a:ext cx="6530376" cy="3505200"/>
         </p:xfrm>
         <a:graphic>
           <a:graphicData uri="http://schemas.openxmlformats.org/drawingml/2006/table">
@@ -5679,7 +5641,7 @@
                           </a:solidFill>
                           <a:latin typeface="IBM Plex Mono" panose="020B0509050203000203" pitchFamily="49" charset="0"/>
                         </a:rPr>
-                        <a:t>7 P</a:t>
+                        <a:t>6:40 P</a:t>
                       </a:r>
                     </a:p>
                   </a:txBody>
@@ -5770,7 +5732,7 @@
                           </a:solidFill>
                           <a:latin typeface="IBM Plex Mono" panose="020B0509050203000203" pitchFamily="49" charset="0"/>
                         </a:rPr>
-                        <a:t>Introductions</a:t>
+                        <a:t>Pizza &amp; Networking</a:t>
                       </a:r>
                       <a:endParaRPr lang="en-US" sz="1400" b="0" dirty="0">
                         <a:solidFill>
@@ -5824,7 +5786,7 @@
                           </a:solidFill>
                           <a:latin typeface="IBM Plex Mono" panose="020B0509050203000203" pitchFamily="49" charset="0"/>
                         </a:rPr>
-                        <a:t>7:05 P</a:t>
+                        <a:t>7:00 P</a:t>
                       </a:r>
                     </a:p>
                   </a:txBody>
@@ -5984,150 +5946,6 @@
                           </a:solidFill>
                           <a:latin typeface="IBM Plex Mono" panose="020B0509050203000203" pitchFamily="49" charset="0"/>
                         </a:rPr>
-                        <a:t>7:25 P</a:t>
-                      </a:r>
-                    </a:p>
-                  </a:txBody>
-                  <a:tcPr anchor="ctr">
-                    <a:lnL w="12700" cmpd="sng">
-                      <a:noFill/>
-                    </a:lnL>
-                    <a:lnR w="12700" cmpd="sng">
-                      <a:noFill/>
-                    </a:lnR>
-                    <a:lnT w="12700" cmpd="sng">
-                      <a:noFill/>
-                    </a:lnT>
-                    <a:lnB w="38100" cmpd="sng">
-                      <a:noFill/>
-                    </a:lnB>
-                    <a:lnTlToBr w="12700" cmpd="sng">
-                      <a:noFill/>
-                      <a:prstDash val="solid"/>
-                    </a:lnTlToBr>
-                    <a:lnBlToTr w="12700" cmpd="sng">
-                      <a:noFill/>
-                      <a:prstDash val="solid"/>
-                    </a:lnBlToTr>
-                    <a:noFill/>
-                  </a:tcPr>
-                </a:tc>
-                <a:tc>
-                  <a:txBody>
-                    <a:bodyPr/>
-                    <a:lstStyle/>
-                    <a:p>
-                      <a:pPr algn="ctr"/>
-                      <a:r>
-                        <a:rPr lang="en-US" sz="4000" b="0" i="0" kern="1200" dirty="0">
-                          <a:solidFill>
-                            <a:schemeClr val="bg1"/>
-                          </a:solidFill>
-                          <a:effectLst/>
-                          <a:latin typeface="Arial" panose="020B0604020202020204" pitchFamily="34" charset="0"/>
-                          <a:ea typeface="+mn-ea"/>
-                          <a:cs typeface="Arial" panose="020B0604020202020204" pitchFamily="34" charset="0"/>
-                        </a:rPr>
-                        <a:t>•</a:t>
-                      </a:r>
-                      <a:endParaRPr lang="en-US" sz="4000" b="0" dirty="0">
-                        <a:solidFill>
-                          <a:schemeClr val="bg1"/>
-                        </a:solidFill>
-                        <a:latin typeface="Arial" panose="020B0604020202020204" pitchFamily="34" charset="0"/>
-                        <a:cs typeface="Arial" panose="020B0604020202020204" pitchFamily="34" charset="0"/>
-                      </a:endParaRPr>
-                    </a:p>
-                  </a:txBody>
-                  <a:tcPr anchor="ctr">
-                    <a:lnL w="12700" cmpd="sng">
-                      <a:noFill/>
-                    </a:lnL>
-                    <a:lnR w="12700" cmpd="sng">
-                      <a:noFill/>
-                    </a:lnR>
-                    <a:lnT w="12700" cmpd="sng">
-                      <a:noFill/>
-                    </a:lnT>
-                    <a:lnB w="38100" cmpd="sng">
-                      <a:noFill/>
-                    </a:lnB>
-                    <a:lnTlToBr w="12700" cmpd="sng">
-                      <a:noFill/>
-                      <a:prstDash val="solid"/>
-                    </a:lnTlToBr>
-                    <a:lnBlToTr w="12700" cmpd="sng">
-                      <a:noFill/>
-                      <a:prstDash val="solid"/>
-                    </a:lnBlToTr>
-                    <a:noFill/>
-                  </a:tcPr>
-                </a:tc>
-                <a:tc>
-                  <a:txBody>
-                    <a:bodyPr/>
-                    <a:lstStyle/>
-                    <a:p>
-                      <a:pPr>
-                        <a:lnSpc>
-                          <a:spcPct val="150000"/>
-                        </a:lnSpc>
-                      </a:pPr>
-                      <a:r>
-                        <a:rPr lang="en-US" sz="1100" b="0" dirty="0">
-                          <a:solidFill>
-                            <a:schemeClr val="bg1"/>
-                          </a:solidFill>
-                          <a:latin typeface="IBM Plex Mono" panose="020B0509050203000203" pitchFamily="49" charset="0"/>
-                        </a:rPr>
-                        <a:t>Questions &amp; Break</a:t>
-                      </a:r>
-                    </a:p>
-                  </a:txBody>
-                  <a:tcPr anchor="ctr">
-                    <a:lnL w="12700" cmpd="sng">
-                      <a:noFill/>
-                    </a:lnL>
-                    <a:lnR w="12700" cmpd="sng">
-                      <a:noFill/>
-                    </a:lnR>
-                    <a:lnT w="12700" cmpd="sng">
-                      <a:noFill/>
-                    </a:lnT>
-                    <a:lnB w="38100" cmpd="sng">
-                      <a:noFill/>
-                    </a:lnB>
-                    <a:lnTlToBr w="12700" cmpd="sng">
-                      <a:noFill/>
-                      <a:prstDash val="solid"/>
-                    </a:lnTlToBr>
-                    <a:lnBlToTr w="12700" cmpd="sng">
-                      <a:noFill/>
-                      <a:prstDash val="solid"/>
-                    </a:lnBlToTr>
-                    <a:noFill/>
-                  </a:tcPr>
-                </a:tc>
-                <a:extLst>
-                  <a:ext uri="{0D108BD9-81ED-4DB2-BD59-A6C34878D82A}">
-                    <a16:rowId xmlns:a16="http://schemas.microsoft.com/office/drawing/2014/main" val="1058864157"/>
-                  </a:ext>
-                </a:extLst>
-              </a:tr>
-              <a:tr h="701040">
-                <a:tc>
-                  <a:txBody>
-                    <a:bodyPr/>
-                    <a:lstStyle/>
-                    <a:p>
-                      <a:pPr algn="r"/>
-                      <a:r>
-                        <a:rPr lang="en-US" sz="1400" b="0" dirty="0">
-                          <a:solidFill>
-                            <a:schemeClr val="bg1"/>
-                          </a:solidFill>
-                          <a:latin typeface="IBM Plex Mono" panose="020B0509050203000203" pitchFamily="49" charset="0"/>
-                        </a:rPr>
                         <a:t>7:30 P</a:t>
                       </a:r>
                     </a:p>
@@ -6244,7 +6062,7 @@
                           <a:ea typeface="+mn-ea"/>
                           <a:cs typeface="+mn-cs"/>
                         </a:rPr>
-                        <a:t>Talk 2</a:t>
+                        <a:t>Open Mic / Lightning Talks</a:t>
                       </a:r>
                     </a:p>
                     <a:p>
@@ -6280,7 +6098,7 @@
                           <a:ea typeface="+mn-ea"/>
                           <a:cs typeface="+mn-cs"/>
                         </a:rPr>
-                        <a:t>Speaker Name</a:t>
+                        <a:t>Anyone</a:t>
                       </a:r>
                     </a:p>
                   </a:txBody>
@@ -6444,7 +6262,7 @@
                           <a:ea typeface="+mn-ea"/>
                           <a:cs typeface="+mn-cs"/>
                         </a:rPr>
-                        <a:t>Questions</a:t>
+                        <a:t>Q &amp; A</a:t>
                       </a:r>
                       <a:endParaRPr kumimoji="0" lang="en-US" sz="800" b="0" i="0" u="none" strike="noStrike" kern="1200" cap="none" spc="0" normalizeH="0" baseline="0" noProof="0" dirty="0">
                         <a:ln>
@@ -6622,7 +6440,7 @@
                           <a:ea typeface="+mn-ea"/>
                           <a:cs typeface="+mn-cs"/>
                         </a:rPr>
-                        <a:t>Open Mic</a:t>
+                        <a:t>Wrap Up</a:t>
                       </a:r>
                       <a:endParaRPr kumimoji="0" lang="en-US" sz="800" b="0" i="0" u="none" strike="noStrike" kern="1200" cap="none" spc="0" normalizeH="0" baseline="0" noProof="0" dirty="0">
                         <a:ln>
@@ -6690,8 +6508,8 @@
         </p:nvCxnSpPr>
         <p:spPr>
           <a:xfrm>
-            <a:off x="6096000" y="1918930"/>
-            <a:ext cx="0" cy="3540579"/>
+            <a:off x="6096000" y="1987109"/>
+            <a:ext cx="0" cy="2815728"/>
           </a:xfrm>
           <a:prstGeom prst="line">
             <a:avLst/>
@@ -6825,14 +6643,6 @@
 <file path=ppt/slides/slide4.xml><?xml version="1.0" encoding="utf-8"?>
 <p:sld xmlns:a="http://schemas.openxmlformats.org/drawingml/2006/main" xmlns:r="http://schemas.openxmlformats.org/officeDocument/2006/relationships" xmlns:p="http://schemas.openxmlformats.org/presentationml/2006/main">
   <p:cSld>
-    <p:bg>
-      <p:bgPr>
-        <a:solidFill>
-          <a:schemeClr val="bg2"/>
-        </a:solidFill>
-        <a:effectLst/>
-      </p:bgPr>
-    </p:bg>
     <p:spTree>
       <p:nvGrpSpPr>
         <p:cNvPr id="1" name=""/>
@@ -7000,14 +6810,6 @@
 <file path=ppt/slides/slide5.xml><?xml version="1.0" encoding="utf-8"?>
 <p:sld xmlns:a="http://schemas.openxmlformats.org/drawingml/2006/main" xmlns:r="http://schemas.openxmlformats.org/officeDocument/2006/relationships" xmlns:p="http://schemas.openxmlformats.org/presentationml/2006/main">
   <p:cSld>
-    <p:bg>
-      <p:bgPr>
-        <a:solidFill>
-          <a:schemeClr val="bg2"/>
-        </a:solidFill>
-        <a:effectLst/>
-      </p:bgPr>
-    </p:bg>
     <p:spTree>
       <p:nvGrpSpPr>
         <p:cNvPr id="1" name=""/>
@@ -7210,14 +7012,6 @@
 <file path=ppt/slides/slide6.xml><?xml version="1.0" encoding="utf-8"?>
 <p:sld xmlns:a="http://schemas.openxmlformats.org/drawingml/2006/main" xmlns:r="http://schemas.openxmlformats.org/officeDocument/2006/relationships" xmlns:p="http://schemas.openxmlformats.org/presentationml/2006/main">
   <p:cSld>
-    <p:bg>
-      <p:bgPr>
-        <a:solidFill>
-          <a:schemeClr val="bg2"/>
-        </a:solidFill>
-        <a:effectLst/>
-      </p:bgPr>
-    </p:bg>
     <p:spTree>
       <p:nvGrpSpPr>
         <p:cNvPr id="1" name=""/>
@@ -7390,14 +7184,6 @@
 <file path=ppt/slides/slide7.xml><?xml version="1.0" encoding="utf-8"?>
 <p:sld xmlns:a="http://schemas.openxmlformats.org/drawingml/2006/main" xmlns:r="http://schemas.openxmlformats.org/officeDocument/2006/relationships" xmlns:p="http://schemas.openxmlformats.org/presentationml/2006/main">
   <p:cSld>
-    <p:bg>
-      <p:bgPr>
-        <a:solidFill>
-          <a:schemeClr val="bg2"/>
-        </a:solidFill>
-        <a:effectLst/>
-      </p:bgPr>
-    </p:bg>
     <p:spTree>
       <p:nvGrpSpPr>
         <p:cNvPr id="1" name=""/>
@@ -7563,14 +7349,6 @@
 <file path=ppt/slides/slide8.xml><?xml version="1.0" encoding="utf-8"?>
 <p:sld xmlns:a="http://schemas.openxmlformats.org/drawingml/2006/main" xmlns:r="http://schemas.openxmlformats.org/officeDocument/2006/relationships" xmlns:p="http://schemas.openxmlformats.org/presentationml/2006/main">
   <p:cSld>
-    <p:bg>
-      <p:bgPr>
-        <a:solidFill>
-          <a:schemeClr val="bg2"/>
-        </a:solidFill>
-        <a:effectLst/>
-      </p:bgPr>
-    </p:bg>
     <p:spTree>
       <p:nvGrpSpPr>
         <p:cNvPr id="1" name=""/>
@@ -7736,14 +7514,6 @@
 <file path=ppt/slides/slide9.xml><?xml version="1.0" encoding="utf-8"?>
 <p:sld xmlns:a="http://schemas.openxmlformats.org/drawingml/2006/main" xmlns:r="http://schemas.openxmlformats.org/officeDocument/2006/relationships" xmlns:p="http://schemas.openxmlformats.org/presentationml/2006/main">
   <p:cSld>
-    <p:bg>
-      <p:bgPr>
-        <a:solidFill>
-          <a:schemeClr val="bg2"/>
-        </a:solidFill>
-        <a:effectLst/>
-      </p:bgPr>
-    </p:bg>
     <p:spTree>
       <p:nvGrpSpPr>
         <p:cNvPr id="1" name=""/>

</xml_diff>